<commit_message>
modifico presentacion para trabajo final
</commit_message>
<xml_diff>
--- a/docs/Trabajo Final De Ingeniería En Software.pptx
+++ b/docs/Trabajo Final De Ingeniería En Software.pptx
@@ -17,8 +17,19 @@
     <p:sldId id="260" r:id="rId11"/>
     <p:sldId id="261" r:id="rId12"/>
     <p:sldId id="262" r:id="rId13"/>
-    <p:sldId id="264" r:id="rId14"/>
-    <p:sldId id="270" r:id="rId15"/>
+    <p:sldId id="273" r:id="rId14"/>
+    <p:sldId id="271" r:id="rId15"/>
+    <p:sldId id="272" r:id="rId16"/>
+    <p:sldId id="274" r:id="rId17"/>
+    <p:sldId id="264" r:id="rId18"/>
+    <p:sldId id="275" r:id="rId19"/>
+    <p:sldId id="276" r:id="rId20"/>
+    <p:sldId id="277" r:id="rId21"/>
+    <p:sldId id="278" r:id="rId22"/>
+    <p:sldId id="279" r:id="rId23"/>
+    <p:sldId id="280" r:id="rId24"/>
+    <p:sldId id="281" r:id="rId25"/>
+    <p:sldId id="270" r:id="rId26"/>
   </p:sldIdLst>
   <p:sldSz cx="12192000" cy="6858000"/>
   <p:notesSz cx="6858000" cy="9144000"/>
@@ -117,6 +128,11 @@
       </a:defRPr>
     </a:lvl9pPr>
   </p:defaultTextStyle>
+  <p:extLst>
+    <p:ext uri="{EFAFB233-063F-42B5-8137-9DF3F51BA10A}">
+      <p15:sldGuideLst xmlns:p15="http://schemas.microsoft.com/office/powerpoint/2012/main"/>
+    </p:ext>
+  </p:extLst>
 </p:presentation>
 </file>
 
@@ -4288,162 +4304,50 @@
             <p:ph type="title"/>
           </p:nvPr>
         </p:nvSpPr>
-        <p:spPr/>
+        <p:spPr>
+          <a:xfrm>
+            <a:off x="0" y="0"/>
+            <a:ext cx="9417032" cy="938870"/>
+          </a:xfrm>
+        </p:spPr>
         <p:txBody>
           <a:bodyPr/>
           <a:lstStyle/>
           <a:p>
             <a:r>
-              <a:rPr lang="es-AR" dirty="0" err="1" smtClean="0"/>
-              <a:t>Crazy</a:t>
-            </a:r>
-            <a:r>
               <a:rPr lang="es-AR" dirty="0" smtClean="0"/>
-              <a:t> </a:t>
-            </a:r>
-            <a:r>
-              <a:rPr lang="es-AR" dirty="0" err="1" smtClean="0"/>
-              <a:t>Question</a:t>
+              <a:t>Clases e interfaces</a:t>
             </a:r>
             <a:endParaRPr lang="es-ES" dirty="0"/>
           </a:p>
         </p:txBody>
       </p:sp>
-      <p:sp>
-        <p:nvSpPr>
-          <p:cNvPr id="3" name="Marcador de contenido 2"/>
-          <p:cNvSpPr>
-            <a:spLocks noGrp="1"/>
-          </p:cNvSpPr>
+      <p:pic>
+        <p:nvPicPr>
+          <p:cNvPr id="5" name="Marcador de contenido 4"/>
+          <p:cNvPicPr>
+            <a:picLocks noGrp="1" noChangeAspect="1"/>
+          </p:cNvPicPr>
           <p:nvPr>
             <p:ph idx="1"/>
           </p:nvPr>
-        </p:nvSpPr>
-        <p:spPr/>
-        <p:txBody>
-          <a:bodyPr/>
-          <a:lstStyle/>
-          <a:p>
-            <a:r>
-              <a:rPr lang="es-AR" dirty="0" smtClean="0"/>
-              <a:t>Para nuestro diseño vemos que se siguió el patrón de arquitectura </a:t>
-            </a:r>
-            <a:r>
-              <a:rPr lang="es-AR" dirty="0" err="1" smtClean="0"/>
-              <a:t>Model</a:t>
-            </a:r>
-            <a:r>
-              <a:rPr lang="es-AR" dirty="0" smtClean="0"/>
-              <a:t> View </a:t>
-            </a:r>
-            <a:r>
-              <a:rPr lang="es-AR" dirty="0" err="1" smtClean="0"/>
-              <a:t>Controller</a:t>
-            </a:r>
-            <a:r>
-              <a:rPr lang="es-AR" dirty="0" smtClean="0"/>
-              <a:t> (MVC)</a:t>
-            </a:r>
-          </a:p>
-          <a:p>
-            <a:r>
-              <a:rPr lang="es-AR" dirty="0" smtClean="0"/>
-              <a:t>Adaptamos nuestro modelo al patrón dado, con un patrón de diseño </a:t>
-            </a:r>
-            <a:r>
-              <a:rPr lang="es-AR" dirty="0" err="1"/>
-              <a:t>A</a:t>
-            </a:r>
-            <a:r>
-              <a:rPr lang="es-AR" dirty="0" err="1" smtClean="0"/>
-              <a:t>dapter</a:t>
-            </a:r>
-            <a:r>
-              <a:rPr lang="es-AR" dirty="0" smtClean="0"/>
-              <a:t>. Además de esto para hacer un cambio en tiempo real de los modelos realizados ( </a:t>
-            </a:r>
-            <a:r>
-              <a:rPr lang="es-AR" dirty="0" err="1" smtClean="0"/>
-              <a:t>Question</a:t>
-            </a:r>
-            <a:r>
-              <a:rPr lang="es-AR" dirty="0" smtClean="0"/>
-              <a:t> </a:t>
-            </a:r>
-            <a:r>
-              <a:rPr lang="es-AR" dirty="0" err="1" smtClean="0"/>
-              <a:t>view</a:t>
-            </a:r>
-            <a:r>
-              <a:rPr lang="es-AR" dirty="0" smtClean="0"/>
-              <a:t>, </a:t>
-            </a:r>
-            <a:r>
-              <a:rPr lang="es-AR" dirty="0" err="1" smtClean="0"/>
-              <a:t>Heart</a:t>
-            </a:r>
-            <a:r>
-              <a:rPr lang="es-AR" dirty="0" smtClean="0"/>
-              <a:t> View y </a:t>
-            </a:r>
-            <a:r>
-              <a:rPr lang="es-AR" dirty="0" err="1" smtClean="0"/>
-              <a:t>DJView</a:t>
-            </a:r>
-            <a:r>
-              <a:rPr lang="es-AR" dirty="0" smtClean="0"/>
-              <a:t>) utilizamos el patrón </a:t>
-            </a:r>
-            <a:r>
-              <a:rPr lang="es-AR" dirty="0" err="1" smtClean="0"/>
-              <a:t>Strategy</a:t>
-            </a:r>
-            <a:r>
-              <a:rPr lang="es-AR" dirty="0" smtClean="0"/>
-              <a:t>.</a:t>
-            </a:r>
-          </a:p>
-          <a:p>
-            <a:r>
-              <a:rPr lang="es-AR" dirty="0" smtClean="0"/>
-              <a:t>Como vimos en las imágenes anteriores el diseño esta enfocado de modo que siga los modelos ejemplos que nos proporcionaron. Además se realizo un patrón de diseño  </a:t>
-            </a:r>
-            <a:r>
-              <a:rPr lang="es-AR" dirty="0" err="1" smtClean="0"/>
-              <a:t>Singleton</a:t>
-            </a:r>
-            <a:r>
-              <a:rPr lang="es-AR" dirty="0" smtClean="0"/>
-              <a:t> para el </a:t>
-            </a:r>
-            <a:r>
-              <a:rPr lang="es-AR" dirty="0" err="1" smtClean="0"/>
-              <a:t>Heart</a:t>
-            </a:r>
-            <a:r>
-              <a:rPr lang="es-AR" dirty="0" smtClean="0"/>
-              <a:t> </a:t>
-            </a:r>
-            <a:r>
-              <a:rPr lang="es-AR" dirty="0" err="1" smtClean="0"/>
-              <a:t>Model</a:t>
-            </a:r>
-            <a:r>
-              <a:rPr lang="es-AR" dirty="0" smtClean="0"/>
-              <a:t>, de modo tal que cada vez que se quiera crear una nueva instancia de esta se cuente y se muestre en </a:t>
-            </a:r>
-            <a:r>
-              <a:rPr lang="es-AR" dirty="0" err="1" smtClean="0"/>
-              <a:t>BeatBar</a:t>
-            </a:r>
-            <a:r>
-              <a:rPr lang="es-AR" dirty="0" smtClean="0"/>
-              <a:t>.</a:t>
-            </a:r>
-            <a:endParaRPr lang="es-ES" dirty="0"/>
-          </a:p>
-        </p:txBody>
-      </p:sp>
+        </p:nvPicPr>
+        <p:blipFill>
+          <a:blip r:embed="rId2"/>
+          <a:stretch>
+            <a:fillRect/>
+          </a:stretch>
+        </p:blipFill>
+        <p:spPr>
+          <a:xfrm>
+            <a:off x="-1" y="757237"/>
+            <a:ext cx="4765183" cy="6090837"/>
+          </a:xfrm>
+          <a:prstGeom prst="rect">
+            <a:avLst/>
+          </a:prstGeom>
+        </p:spPr>
+      </p:pic>
       <p:pic>
         <p:nvPicPr>
           <p:cNvPr id="4" name="Imagen 3"/>
@@ -4453,7 +4357,7 @@
           <p:nvPr/>
         </p:nvPicPr>
         <p:blipFill>
-          <a:blip r:embed="rId2">
+          <a:blip r:embed="rId3">
             <a:extLst>
               <a:ext uri="{28A0092B-C50C-407E-A947-70E740481C1C}">
                 <a14:useLocalDpi xmlns:a14="http://schemas.microsoft.com/office/drawing/2010/main" val="0"/>
@@ -4477,7 +4381,7 @@
     </p:spTree>
     <p:extLst>
       <p:ext uri="{BB962C8B-B14F-4D97-AF65-F5344CB8AC3E}">
-        <p14:creationId xmlns:p14="http://schemas.microsoft.com/office/powerpoint/2010/main" val="698786866"/>
+        <p14:creationId xmlns:p14="http://schemas.microsoft.com/office/powerpoint/2010/main" val="1338501439"/>
       </p:ext>
     </p:extLst>
   </p:cSld>
@@ -4528,20 +4432,117 @@
           <a:p>
             <a:r>
               <a:rPr lang="es-AR" dirty="0" smtClean="0"/>
-              <a:t>Muchas gracias por escucharnos</a:t>
+              <a:t>Beat </a:t>
+            </a:r>
+            <a:r>
+              <a:rPr lang="es-AR" dirty="0" err="1" smtClean="0"/>
+              <a:t>Model</a:t>
             </a:r>
             <a:endParaRPr lang="es-ES" dirty="0"/>
           </a:p>
         </p:txBody>
       </p:sp>
-      <p:sp>
-        <p:nvSpPr>
-          <p:cNvPr id="3" name="Marcador de contenido 2"/>
-          <p:cNvSpPr>
-            <a:spLocks noGrp="1"/>
-          </p:cNvSpPr>
+      <p:pic>
+        <p:nvPicPr>
+          <p:cNvPr id="4" name="Marcador de contenido 3"/>
+          <p:cNvPicPr>
+            <a:picLocks noGrp="1" noChangeAspect="1"/>
+          </p:cNvPicPr>
           <p:nvPr>
             <p:ph idx="1"/>
+          </p:nvPr>
+        </p:nvPicPr>
+        <p:blipFill>
+          <a:blip r:embed="rId2"/>
+          <a:stretch>
+            <a:fillRect/>
+          </a:stretch>
+        </p:blipFill>
+        <p:spPr>
+          <a:xfrm>
+            <a:off x="1097280" y="2450585"/>
+            <a:ext cx="5023409" cy="2254094"/>
+          </a:xfrm>
+          <a:prstGeom prst="rect">
+            <a:avLst/>
+          </a:prstGeom>
+        </p:spPr>
+      </p:pic>
+      <p:pic>
+        <p:nvPicPr>
+          <p:cNvPr id="5" name="Imagen 4"/>
+          <p:cNvPicPr>
+            <a:picLocks noChangeAspect="1"/>
+          </p:cNvPicPr>
+          <p:nvPr/>
+        </p:nvPicPr>
+        <p:blipFill>
+          <a:blip r:embed="rId3">
+            <a:extLst>
+              <a:ext uri="{28A0092B-C50C-407E-A947-70E740481C1C}">
+                <a14:useLocalDpi xmlns:a14="http://schemas.microsoft.com/office/drawing/2010/main" val="0"/>
+              </a:ext>
+            </a:extLst>
+          </a:blip>
+          <a:stretch>
+            <a:fillRect/>
+          </a:stretch>
+        </p:blipFill>
+        <p:spPr>
+          <a:xfrm>
+            <a:off x="9172575" y="0"/>
+            <a:ext cx="3019425" cy="1514475"/>
+          </a:xfrm>
+          <a:prstGeom prst="rect">
+            <a:avLst/>
+          </a:prstGeom>
+        </p:spPr>
+      </p:pic>
+    </p:spTree>
+    <p:extLst>
+      <p:ext uri="{BB962C8B-B14F-4D97-AF65-F5344CB8AC3E}">
+        <p14:creationId xmlns:p14="http://schemas.microsoft.com/office/powerpoint/2010/main" val="1220704277"/>
+      </p:ext>
+    </p:extLst>
+  </p:cSld>
+  <p:clrMapOvr>
+    <a:masterClrMapping/>
+  </p:clrMapOvr>
+  <p:timing>
+    <p:tnLst>
+      <p:par>
+        <p:cTn id="1" dur="indefinite" restart="never" nodeType="tmRoot"/>
+      </p:par>
+    </p:tnLst>
+  </p:timing>
+</p:sld>
+</file>
+
+<file path=ppt/slides/slide15.xml><?xml version="1.0" encoding="utf-8"?>
+<p:sld xmlns:a="http://schemas.openxmlformats.org/drawingml/2006/main" xmlns:r="http://schemas.openxmlformats.org/officeDocument/2006/relationships" xmlns:p="http://schemas.openxmlformats.org/presentationml/2006/main">
+  <p:cSld>
+    <p:spTree>
+      <p:nvGrpSpPr>
+        <p:cNvPr id="1" name=""/>
+        <p:cNvGrpSpPr/>
+        <p:nvPr/>
+      </p:nvGrpSpPr>
+      <p:grpSpPr>
+        <a:xfrm>
+          <a:off x="0" y="0"/>
+          <a:ext cx="0" cy="0"/>
+          <a:chOff x="0" y="0"/>
+          <a:chExt cx="0" cy="0"/>
+        </a:xfrm>
+      </p:grpSpPr>
+      <p:sp>
+        <p:nvSpPr>
+          <p:cNvPr id="2" name="Título 1"/>
+          <p:cNvSpPr>
+            <a:spLocks noGrp="1"/>
+          </p:cNvSpPr>
+          <p:nvPr>
+            <p:ph type="title"/>
           </p:nvPr>
         </p:nvSpPr>
         <p:spPr/>
@@ -4549,6 +4550,422 @@
           <a:bodyPr/>
           <a:lstStyle/>
           <a:p>
+            <a:r>
+              <a:rPr lang="es-AR" dirty="0" err="1" smtClean="0"/>
+              <a:t>HeartModel</a:t>
+            </a:r>
+            <a:endParaRPr lang="es-ES" dirty="0"/>
+          </a:p>
+        </p:txBody>
+      </p:sp>
+      <p:pic>
+        <p:nvPicPr>
+          <p:cNvPr id="5" name="Marcador de contenido 4"/>
+          <p:cNvPicPr>
+            <a:picLocks noGrp="1" noChangeAspect="1"/>
+          </p:cNvPicPr>
+          <p:nvPr>
+            <p:ph idx="1"/>
+          </p:nvPr>
+        </p:nvPicPr>
+        <p:blipFill>
+          <a:blip r:embed="rId2"/>
+          <a:stretch>
+            <a:fillRect/>
+          </a:stretch>
+        </p:blipFill>
+        <p:spPr>
+          <a:xfrm>
+            <a:off x="1097280" y="1917664"/>
+            <a:ext cx="4541315" cy="1881604"/>
+          </a:xfrm>
+          <a:prstGeom prst="rect">
+            <a:avLst/>
+          </a:prstGeom>
+        </p:spPr>
+      </p:pic>
+      <p:pic>
+        <p:nvPicPr>
+          <p:cNvPr id="4" name="Imagen 3"/>
+          <p:cNvPicPr>
+            <a:picLocks noChangeAspect="1"/>
+          </p:cNvPicPr>
+          <p:nvPr/>
+        </p:nvPicPr>
+        <p:blipFill>
+          <a:blip r:embed="rId3">
+            <a:extLst>
+              <a:ext uri="{28A0092B-C50C-407E-A947-70E740481C1C}">
+                <a14:useLocalDpi xmlns:a14="http://schemas.microsoft.com/office/drawing/2010/main" val="0"/>
+              </a:ext>
+            </a:extLst>
+          </a:blip>
+          <a:stretch>
+            <a:fillRect/>
+          </a:stretch>
+        </p:blipFill>
+        <p:spPr>
+          <a:xfrm>
+            <a:off x="9172575" y="0"/>
+            <a:ext cx="3019425" cy="1514475"/>
+          </a:xfrm>
+          <a:prstGeom prst="rect">
+            <a:avLst/>
+          </a:prstGeom>
+        </p:spPr>
+      </p:pic>
+      <p:pic>
+        <p:nvPicPr>
+          <p:cNvPr id="6" name="Imagen 5"/>
+          <p:cNvPicPr>
+            <a:picLocks noChangeAspect="1"/>
+          </p:cNvPicPr>
+          <p:nvPr/>
+        </p:nvPicPr>
+        <p:blipFill>
+          <a:blip r:embed="rId4"/>
+          <a:stretch>
+            <a:fillRect/>
+          </a:stretch>
+        </p:blipFill>
+        <p:spPr>
+          <a:xfrm>
+            <a:off x="5834196" y="1801078"/>
+            <a:ext cx="5617400" cy="4573964"/>
+          </a:xfrm>
+          <a:prstGeom prst="rect">
+            <a:avLst/>
+          </a:prstGeom>
+        </p:spPr>
+      </p:pic>
+    </p:spTree>
+    <p:extLst>
+      <p:ext uri="{BB962C8B-B14F-4D97-AF65-F5344CB8AC3E}">
+        <p14:creationId xmlns:p14="http://schemas.microsoft.com/office/powerpoint/2010/main" val="224498674"/>
+      </p:ext>
+    </p:extLst>
+  </p:cSld>
+  <p:clrMapOvr>
+    <a:masterClrMapping/>
+  </p:clrMapOvr>
+  <p:timing>
+    <p:tnLst>
+      <p:par>
+        <p:cTn id="1" dur="indefinite" restart="never" nodeType="tmRoot"/>
+      </p:par>
+    </p:tnLst>
+  </p:timing>
+</p:sld>
+</file>
+
+<file path=ppt/slides/slide16.xml><?xml version="1.0" encoding="utf-8"?>
+<p:sld xmlns:a="http://schemas.openxmlformats.org/drawingml/2006/main" xmlns:r="http://schemas.openxmlformats.org/officeDocument/2006/relationships" xmlns:p="http://schemas.openxmlformats.org/presentationml/2006/main">
+  <p:cSld>
+    <p:spTree>
+      <p:nvGrpSpPr>
+        <p:cNvPr id="1" name=""/>
+        <p:cNvGrpSpPr/>
+        <p:nvPr/>
+      </p:nvGrpSpPr>
+      <p:grpSpPr>
+        <a:xfrm>
+          <a:off x="0" y="0"/>
+          <a:ext cx="0" cy="0"/>
+          <a:chOff x="0" y="0"/>
+          <a:chExt cx="0" cy="0"/>
+        </a:xfrm>
+      </p:grpSpPr>
+      <p:sp>
+        <p:nvSpPr>
+          <p:cNvPr id="2" name="Título 1"/>
+          <p:cNvSpPr>
+            <a:spLocks noGrp="1"/>
+          </p:cNvSpPr>
+          <p:nvPr>
+            <p:ph type="title"/>
+          </p:nvPr>
+        </p:nvSpPr>
+        <p:spPr>
+          <a:xfrm>
+            <a:off x="334850" y="90152"/>
+            <a:ext cx="9648852" cy="925991"/>
+          </a:xfrm>
+        </p:spPr>
+        <p:txBody>
+          <a:bodyPr/>
+          <a:lstStyle/>
+          <a:p>
+            <a:r>
+              <a:rPr lang="es-AR" dirty="0" err="1" smtClean="0"/>
+              <a:t>Question</a:t>
+            </a:r>
+            <a:r>
+              <a:rPr lang="es-AR" dirty="0" smtClean="0"/>
+              <a:t> </a:t>
+            </a:r>
+            <a:r>
+              <a:rPr lang="es-AR" dirty="0" err="1" smtClean="0"/>
+              <a:t>Model</a:t>
+            </a:r>
+            <a:endParaRPr lang="es-ES" dirty="0"/>
+          </a:p>
+        </p:txBody>
+      </p:sp>
+      <p:pic>
+        <p:nvPicPr>
+          <p:cNvPr id="5" name="Marcador de contenido 4"/>
+          <p:cNvPicPr>
+            <a:picLocks noGrp="1" noChangeAspect="1"/>
+          </p:cNvPicPr>
+          <p:nvPr>
+            <p:ph idx="1"/>
+          </p:nvPr>
+        </p:nvPicPr>
+        <p:blipFill>
+          <a:blip r:embed="rId2"/>
+          <a:stretch>
+            <a:fillRect/>
+          </a:stretch>
+        </p:blipFill>
+        <p:spPr>
+          <a:xfrm>
+            <a:off x="334850" y="1464366"/>
+            <a:ext cx="8571760" cy="4910676"/>
+          </a:xfrm>
+          <a:prstGeom prst="rect">
+            <a:avLst/>
+          </a:prstGeom>
+        </p:spPr>
+      </p:pic>
+      <p:pic>
+        <p:nvPicPr>
+          <p:cNvPr id="4" name="Imagen 3"/>
+          <p:cNvPicPr>
+            <a:picLocks noChangeAspect="1"/>
+          </p:cNvPicPr>
+          <p:nvPr/>
+        </p:nvPicPr>
+        <p:blipFill>
+          <a:blip r:embed="rId3">
+            <a:extLst>
+              <a:ext uri="{28A0092B-C50C-407E-A947-70E740481C1C}">
+                <a14:useLocalDpi xmlns:a14="http://schemas.microsoft.com/office/drawing/2010/main" val="0"/>
+              </a:ext>
+            </a:extLst>
+          </a:blip>
+          <a:stretch>
+            <a:fillRect/>
+          </a:stretch>
+        </p:blipFill>
+        <p:spPr>
+          <a:xfrm>
+            <a:off x="9172575" y="0"/>
+            <a:ext cx="3019425" cy="1514475"/>
+          </a:xfrm>
+          <a:prstGeom prst="rect">
+            <a:avLst/>
+          </a:prstGeom>
+        </p:spPr>
+      </p:pic>
+    </p:spTree>
+    <p:extLst>
+      <p:ext uri="{BB962C8B-B14F-4D97-AF65-F5344CB8AC3E}">
+        <p14:creationId xmlns:p14="http://schemas.microsoft.com/office/powerpoint/2010/main" val="3227361117"/>
+      </p:ext>
+    </p:extLst>
+  </p:cSld>
+  <p:clrMapOvr>
+    <a:masterClrMapping/>
+  </p:clrMapOvr>
+  <p:timing>
+    <p:tnLst>
+      <p:par>
+        <p:cTn id="1" dur="indefinite" restart="never" nodeType="tmRoot"/>
+      </p:par>
+    </p:tnLst>
+  </p:timing>
+</p:sld>
+</file>
+
+<file path=ppt/slides/slide17.xml><?xml version="1.0" encoding="utf-8"?>
+<p:sld xmlns:a="http://schemas.openxmlformats.org/drawingml/2006/main" xmlns:r="http://schemas.openxmlformats.org/officeDocument/2006/relationships" xmlns:p="http://schemas.openxmlformats.org/presentationml/2006/main">
+  <p:cSld>
+    <p:spTree>
+      <p:nvGrpSpPr>
+        <p:cNvPr id="1" name=""/>
+        <p:cNvGrpSpPr/>
+        <p:nvPr/>
+      </p:nvGrpSpPr>
+      <p:grpSpPr>
+        <a:xfrm>
+          <a:off x="0" y="0"/>
+          <a:ext cx="0" cy="0"/>
+          <a:chOff x="0" y="0"/>
+          <a:chExt cx="0" cy="0"/>
+        </a:xfrm>
+      </p:grpSpPr>
+      <p:sp>
+        <p:nvSpPr>
+          <p:cNvPr id="2" name="Título 1"/>
+          <p:cNvSpPr>
+            <a:spLocks noGrp="1"/>
+          </p:cNvSpPr>
+          <p:nvPr>
+            <p:ph type="title"/>
+          </p:nvPr>
+        </p:nvSpPr>
+        <p:spPr/>
+        <p:txBody>
+          <a:bodyPr/>
+          <a:lstStyle/>
+          <a:p>
+            <a:r>
+              <a:rPr lang="es-AR" dirty="0" err="1" smtClean="0"/>
+              <a:t>Crazy</a:t>
+            </a:r>
+            <a:r>
+              <a:rPr lang="es-AR" dirty="0" smtClean="0"/>
+              <a:t> </a:t>
+            </a:r>
+            <a:r>
+              <a:rPr lang="es-AR" dirty="0" err="1" smtClean="0"/>
+              <a:t>Question</a:t>
+            </a:r>
+            <a:endParaRPr lang="es-ES" dirty="0"/>
+          </a:p>
+        </p:txBody>
+      </p:sp>
+      <p:sp>
+        <p:nvSpPr>
+          <p:cNvPr id="3" name="Marcador de contenido 2"/>
+          <p:cNvSpPr>
+            <a:spLocks noGrp="1"/>
+          </p:cNvSpPr>
+          <p:nvPr>
+            <p:ph idx="1"/>
+          </p:nvPr>
+        </p:nvSpPr>
+        <p:spPr/>
+        <p:txBody>
+          <a:bodyPr/>
+          <a:lstStyle/>
+          <a:p>
+            <a:r>
+              <a:rPr lang="es-AR" dirty="0" smtClean="0"/>
+              <a:t>Para nuestro diseño vemos que se siguió el patrón de arquitectura </a:t>
+            </a:r>
+            <a:r>
+              <a:rPr lang="es-AR" dirty="0" err="1" smtClean="0"/>
+              <a:t>Model</a:t>
+            </a:r>
+            <a:r>
+              <a:rPr lang="es-AR" dirty="0" smtClean="0"/>
+              <a:t> View </a:t>
+            </a:r>
+            <a:r>
+              <a:rPr lang="es-AR" dirty="0" err="1" smtClean="0"/>
+              <a:t>Controller</a:t>
+            </a:r>
+            <a:r>
+              <a:rPr lang="es-AR" dirty="0" smtClean="0"/>
+              <a:t> (MVC)</a:t>
+            </a:r>
+          </a:p>
+          <a:p>
+            <a:r>
+              <a:rPr lang="es-AR" dirty="0" smtClean="0"/>
+              <a:t>Adaptamos nuestro modelo al patrón dado, con un patrón de diseño </a:t>
+            </a:r>
+            <a:r>
+              <a:rPr lang="es-AR" dirty="0" err="1"/>
+              <a:t>A</a:t>
+            </a:r>
+            <a:r>
+              <a:rPr lang="es-AR" dirty="0" err="1" smtClean="0"/>
+              <a:t>dapter</a:t>
+            </a:r>
+            <a:r>
+              <a:rPr lang="es-AR" dirty="0" smtClean="0"/>
+              <a:t>. Además de esto para hacer un cambio en tiempo real de los modelos realizados ( </a:t>
+            </a:r>
+            <a:r>
+              <a:rPr lang="es-AR" dirty="0" err="1" smtClean="0"/>
+              <a:t>Question</a:t>
+            </a:r>
+            <a:r>
+              <a:rPr lang="es-AR" dirty="0" smtClean="0"/>
+              <a:t> </a:t>
+            </a:r>
+            <a:r>
+              <a:rPr lang="es-AR" dirty="0" err="1" smtClean="0"/>
+              <a:t>view</a:t>
+            </a:r>
+            <a:r>
+              <a:rPr lang="es-AR" dirty="0" smtClean="0"/>
+              <a:t>, </a:t>
+            </a:r>
+            <a:r>
+              <a:rPr lang="es-AR" dirty="0" err="1" smtClean="0"/>
+              <a:t>Heart</a:t>
+            </a:r>
+            <a:r>
+              <a:rPr lang="es-AR" dirty="0" smtClean="0"/>
+              <a:t> View y </a:t>
+            </a:r>
+            <a:r>
+              <a:rPr lang="es-AR" dirty="0" err="1" smtClean="0"/>
+              <a:t>DJView</a:t>
+            </a:r>
+            <a:r>
+              <a:rPr lang="es-AR" dirty="0" smtClean="0"/>
+              <a:t>) utilizamos el patrón </a:t>
+            </a:r>
+            <a:r>
+              <a:rPr lang="es-AR" dirty="0" err="1" smtClean="0"/>
+              <a:t>Strategy</a:t>
+            </a:r>
+            <a:r>
+              <a:rPr lang="es-AR" dirty="0" smtClean="0"/>
+              <a:t>.</a:t>
+            </a:r>
+          </a:p>
+          <a:p>
+            <a:r>
+              <a:rPr lang="es-AR" dirty="0" smtClean="0"/>
+              <a:t>Como vimos en las imágenes anteriores el diseño esta enfocado de modo que siga los modelos ejemplos que nos proporcionaron. Además se realizo un patrón de diseño  </a:t>
+            </a:r>
+            <a:r>
+              <a:rPr lang="es-AR" dirty="0" err="1" smtClean="0"/>
+              <a:t>Singleton</a:t>
+            </a:r>
+            <a:r>
+              <a:rPr lang="es-AR" dirty="0" smtClean="0"/>
+              <a:t> para el </a:t>
+            </a:r>
+            <a:r>
+              <a:rPr lang="es-AR" dirty="0" err="1" smtClean="0"/>
+              <a:t>Heart</a:t>
+            </a:r>
+            <a:r>
+              <a:rPr lang="es-AR" dirty="0" smtClean="0"/>
+              <a:t> </a:t>
+            </a:r>
+            <a:r>
+              <a:rPr lang="es-AR" dirty="0" err="1" smtClean="0"/>
+              <a:t>Model</a:t>
+            </a:r>
+            <a:r>
+              <a:rPr lang="es-AR" dirty="0" smtClean="0"/>
+              <a:t>, de modo tal que cada vez que se quiera crear una nueva instancia de esta se cuente y se muestre en </a:t>
+            </a:r>
+            <a:r>
+              <a:rPr lang="es-AR" dirty="0" err="1" smtClean="0"/>
+              <a:t>BeatBar</a:t>
+            </a:r>
+            <a:r>
+              <a:rPr lang="es-AR" dirty="0" smtClean="0"/>
+              <a:t>.</a:t>
+            </a:r>
             <a:endParaRPr lang="es-ES" dirty="0"/>
           </a:p>
         </p:txBody>
@@ -4586,7 +5003,255 @@
     </p:spTree>
     <p:extLst>
       <p:ext uri="{BB962C8B-B14F-4D97-AF65-F5344CB8AC3E}">
-        <p14:creationId xmlns:p14="http://schemas.microsoft.com/office/powerpoint/2010/main" val="2026814309"/>
+        <p14:creationId xmlns:p14="http://schemas.microsoft.com/office/powerpoint/2010/main" val="698786866"/>
+      </p:ext>
+    </p:extLst>
+  </p:cSld>
+  <p:clrMapOvr>
+    <a:masterClrMapping/>
+  </p:clrMapOvr>
+  <p:timing>
+    <p:tnLst>
+      <p:par>
+        <p:cTn id="1" dur="indefinite" restart="never" nodeType="tmRoot"/>
+      </p:par>
+    </p:tnLst>
+  </p:timing>
+</p:sld>
+</file>
+
+<file path=ppt/slides/slide18.xml><?xml version="1.0" encoding="utf-8"?>
+<p:sld xmlns:a="http://schemas.openxmlformats.org/drawingml/2006/main" xmlns:r="http://schemas.openxmlformats.org/officeDocument/2006/relationships" xmlns:p="http://schemas.openxmlformats.org/presentationml/2006/main">
+  <p:cSld>
+    <p:spTree>
+      <p:nvGrpSpPr>
+        <p:cNvPr id="1" name=""/>
+        <p:cNvGrpSpPr/>
+        <p:nvPr/>
+      </p:nvGrpSpPr>
+      <p:grpSpPr>
+        <a:xfrm>
+          <a:off x="0" y="0"/>
+          <a:ext cx="0" cy="0"/>
+          <a:chOff x="0" y="0"/>
+          <a:chExt cx="0" cy="0"/>
+        </a:xfrm>
+      </p:grpSpPr>
+      <p:sp>
+        <p:nvSpPr>
+          <p:cNvPr id="2" name="Título 1"/>
+          <p:cNvSpPr>
+            <a:spLocks noGrp="1"/>
+          </p:cNvSpPr>
+          <p:nvPr>
+            <p:ph type="title"/>
+          </p:nvPr>
+        </p:nvSpPr>
+        <p:spPr/>
+        <p:txBody>
+          <a:bodyPr/>
+          <a:lstStyle/>
+          <a:p>
+            <a:r>
+              <a:rPr lang="es-AR" dirty="0" err="1" smtClean="0"/>
+              <a:t>Crazy</a:t>
+            </a:r>
+            <a:r>
+              <a:rPr lang="es-AR" dirty="0" smtClean="0"/>
+              <a:t> </a:t>
+            </a:r>
+            <a:r>
+              <a:rPr lang="es-AR" dirty="0" err="1" smtClean="0"/>
+              <a:t>Question</a:t>
+            </a:r>
+            <a:endParaRPr lang="es-ES" dirty="0"/>
+          </a:p>
+        </p:txBody>
+      </p:sp>
+      <p:pic>
+        <p:nvPicPr>
+          <p:cNvPr id="5" name="Marcador de contenido 4"/>
+          <p:cNvPicPr>
+            <a:picLocks noGrp="1" noChangeAspect="1"/>
+          </p:cNvPicPr>
+          <p:nvPr>
+            <p:ph idx="1"/>
+          </p:nvPr>
+        </p:nvPicPr>
+        <p:blipFill>
+          <a:blip r:embed="rId2"/>
+          <a:stretch>
+            <a:fillRect/>
+          </a:stretch>
+        </p:blipFill>
+        <p:spPr>
+          <a:xfrm>
+            <a:off x="1097280" y="1737360"/>
+            <a:ext cx="8075295" cy="4637908"/>
+          </a:xfrm>
+          <a:prstGeom prst="rect">
+            <a:avLst/>
+          </a:prstGeom>
+        </p:spPr>
+      </p:pic>
+      <p:pic>
+        <p:nvPicPr>
+          <p:cNvPr id="4" name="Imagen 3"/>
+          <p:cNvPicPr>
+            <a:picLocks noChangeAspect="1"/>
+          </p:cNvPicPr>
+          <p:nvPr/>
+        </p:nvPicPr>
+        <p:blipFill>
+          <a:blip r:embed="rId3">
+            <a:extLst>
+              <a:ext uri="{28A0092B-C50C-407E-A947-70E740481C1C}">
+                <a14:useLocalDpi xmlns:a14="http://schemas.microsoft.com/office/drawing/2010/main" val="0"/>
+              </a:ext>
+            </a:extLst>
+          </a:blip>
+          <a:stretch>
+            <a:fillRect/>
+          </a:stretch>
+        </p:blipFill>
+        <p:spPr>
+          <a:xfrm>
+            <a:off x="9172575" y="0"/>
+            <a:ext cx="3019425" cy="1514475"/>
+          </a:xfrm>
+          <a:prstGeom prst="rect">
+            <a:avLst/>
+          </a:prstGeom>
+        </p:spPr>
+      </p:pic>
+    </p:spTree>
+    <p:extLst>
+      <p:ext uri="{BB962C8B-B14F-4D97-AF65-F5344CB8AC3E}">
+        <p14:creationId xmlns:p14="http://schemas.microsoft.com/office/powerpoint/2010/main" val="1540648222"/>
+      </p:ext>
+    </p:extLst>
+  </p:cSld>
+  <p:clrMapOvr>
+    <a:masterClrMapping/>
+  </p:clrMapOvr>
+  <p:timing>
+    <p:tnLst>
+      <p:par>
+        <p:cTn id="1" dur="indefinite" restart="never" nodeType="tmRoot"/>
+      </p:par>
+    </p:tnLst>
+  </p:timing>
+</p:sld>
+</file>
+
+<file path=ppt/slides/slide19.xml><?xml version="1.0" encoding="utf-8"?>
+<p:sld xmlns:a="http://schemas.openxmlformats.org/drawingml/2006/main" xmlns:r="http://schemas.openxmlformats.org/officeDocument/2006/relationships" xmlns:p="http://schemas.openxmlformats.org/presentationml/2006/main">
+  <p:cSld>
+    <p:spTree>
+      <p:nvGrpSpPr>
+        <p:cNvPr id="1" name=""/>
+        <p:cNvGrpSpPr/>
+        <p:nvPr/>
+      </p:nvGrpSpPr>
+      <p:grpSpPr>
+        <a:xfrm>
+          <a:off x="0" y="0"/>
+          <a:ext cx="0" cy="0"/>
+          <a:chOff x="0" y="0"/>
+          <a:chExt cx="0" cy="0"/>
+        </a:xfrm>
+      </p:grpSpPr>
+      <p:sp>
+        <p:nvSpPr>
+          <p:cNvPr id="2" name="Título 1"/>
+          <p:cNvSpPr>
+            <a:spLocks noGrp="1"/>
+          </p:cNvSpPr>
+          <p:nvPr>
+            <p:ph type="title"/>
+          </p:nvPr>
+        </p:nvSpPr>
+        <p:spPr/>
+        <p:txBody>
+          <a:bodyPr/>
+          <a:lstStyle/>
+          <a:p>
+            <a:r>
+              <a:rPr lang="es-AR" dirty="0" err="1" smtClean="0"/>
+              <a:t>Crazy</a:t>
+            </a:r>
+            <a:r>
+              <a:rPr lang="es-AR" dirty="0" smtClean="0"/>
+              <a:t> </a:t>
+            </a:r>
+            <a:r>
+              <a:rPr lang="es-AR" dirty="0" err="1" smtClean="0"/>
+              <a:t>Question</a:t>
+            </a:r>
+            <a:endParaRPr lang="es-ES" dirty="0"/>
+          </a:p>
+        </p:txBody>
+      </p:sp>
+      <p:pic>
+        <p:nvPicPr>
+          <p:cNvPr id="5" name="Marcador de contenido 4"/>
+          <p:cNvPicPr>
+            <a:picLocks noGrp="1" noChangeAspect="1"/>
+          </p:cNvPicPr>
+          <p:nvPr>
+            <p:ph idx="1"/>
+          </p:nvPr>
+        </p:nvPicPr>
+        <p:blipFill>
+          <a:blip r:embed="rId2"/>
+          <a:stretch>
+            <a:fillRect/>
+          </a:stretch>
+        </p:blipFill>
+        <p:spPr>
+          <a:xfrm>
+            <a:off x="953036" y="1737360"/>
+            <a:ext cx="7097504" cy="4573288"/>
+          </a:xfrm>
+          <a:prstGeom prst="rect">
+            <a:avLst/>
+          </a:prstGeom>
+        </p:spPr>
+      </p:pic>
+      <p:pic>
+        <p:nvPicPr>
+          <p:cNvPr id="4" name="Imagen 3"/>
+          <p:cNvPicPr>
+            <a:picLocks noChangeAspect="1"/>
+          </p:cNvPicPr>
+          <p:nvPr/>
+        </p:nvPicPr>
+        <p:blipFill>
+          <a:blip r:embed="rId3">
+            <a:extLst>
+              <a:ext uri="{28A0092B-C50C-407E-A947-70E740481C1C}">
+                <a14:useLocalDpi xmlns:a14="http://schemas.microsoft.com/office/drawing/2010/main" val="0"/>
+              </a:ext>
+            </a:extLst>
+          </a:blip>
+          <a:stretch>
+            <a:fillRect/>
+          </a:stretch>
+        </p:blipFill>
+        <p:spPr>
+          <a:xfrm>
+            <a:off x="9172575" y="0"/>
+            <a:ext cx="3019425" cy="1514475"/>
+          </a:xfrm>
+          <a:prstGeom prst="rect">
+            <a:avLst/>
+          </a:prstGeom>
+        </p:spPr>
+      </p:pic>
+    </p:spTree>
+    <p:extLst>
+      <p:ext uri="{BB962C8B-B14F-4D97-AF65-F5344CB8AC3E}">
+        <p14:creationId xmlns:p14="http://schemas.microsoft.com/office/powerpoint/2010/main" val="3919116993"/>
       </p:ext>
     </p:extLst>
   </p:cSld>
@@ -4792,6 +5457,727 @@
     <p:extLst>
       <p:ext uri="{BB962C8B-B14F-4D97-AF65-F5344CB8AC3E}">
         <p14:creationId xmlns:p14="http://schemas.microsoft.com/office/powerpoint/2010/main" val="799259501"/>
+      </p:ext>
+    </p:extLst>
+  </p:cSld>
+  <p:clrMapOvr>
+    <a:masterClrMapping/>
+  </p:clrMapOvr>
+  <p:timing>
+    <p:tnLst>
+      <p:par>
+        <p:cTn id="1" dur="indefinite" restart="never" nodeType="tmRoot"/>
+      </p:par>
+    </p:tnLst>
+  </p:timing>
+</p:sld>
+</file>
+
+<file path=ppt/slides/slide20.xml><?xml version="1.0" encoding="utf-8"?>
+<p:sld xmlns:a="http://schemas.openxmlformats.org/drawingml/2006/main" xmlns:r="http://schemas.openxmlformats.org/officeDocument/2006/relationships" xmlns:p="http://schemas.openxmlformats.org/presentationml/2006/main">
+  <p:cSld>
+    <p:spTree>
+      <p:nvGrpSpPr>
+        <p:cNvPr id="1" name=""/>
+        <p:cNvGrpSpPr/>
+        <p:nvPr/>
+      </p:nvGrpSpPr>
+      <p:grpSpPr>
+        <a:xfrm>
+          <a:off x="0" y="0"/>
+          <a:ext cx="0" cy="0"/>
+          <a:chOff x="0" y="0"/>
+          <a:chExt cx="0" cy="0"/>
+        </a:xfrm>
+      </p:grpSpPr>
+      <p:sp>
+        <p:nvSpPr>
+          <p:cNvPr id="2" name="Título 1"/>
+          <p:cNvSpPr>
+            <a:spLocks noGrp="1"/>
+          </p:cNvSpPr>
+          <p:nvPr>
+            <p:ph type="title"/>
+          </p:nvPr>
+        </p:nvSpPr>
+        <p:spPr/>
+        <p:txBody>
+          <a:bodyPr/>
+          <a:lstStyle/>
+          <a:p>
+            <a:r>
+              <a:rPr lang="es-AR" dirty="0" err="1" smtClean="0"/>
+              <a:t>Crazy</a:t>
+            </a:r>
+            <a:r>
+              <a:rPr lang="es-AR" dirty="0" smtClean="0"/>
+              <a:t> </a:t>
+            </a:r>
+            <a:r>
+              <a:rPr lang="es-AR" dirty="0" err="1" smtClean="0"/>
+              <a:t>Question</a:t>
+            </a:r>
+            <a:endParaRPr lang="es-ES" dirty="0"/>
+          </a:p>
+        </p:txBody>
+      </p:sp>
+      <p:pic>
+        <p:nvPicPr>
+          <p:cNvPr id="4" name="Marcador de contenido 3"/>
+          <p:cNvPicPr>
+            <a:picLocks noGrp="1" noChangeAspect="1"/>
+          </p:cNvPicPr>
+          <p:nvPr>
+            <p:ph idx="1"/>
+          </p:nvPr>
+        </p:nvPicPr>
+        <p:blipFill>
+          <a:blip r:embed="rId2"/>
+          <a:stretch>
+            <a:fillRect/>
+          </a:stretch>
+        </p:blipFill>
+        <p:spPr>
+          <a:xfrm>
+            <a:off x="605308" y="1737360"/>
+            <a:ext cx="7383886" cy="4830865"/>
+          </a:xfrm>
+          <a:prstGeom prst="rect">
+            <a:avLst/>
+          </a:prstGeom>
+        </p:spPr>
+      </p:pic>
+      <p:pic>
+        <p:nvPicPr>
+          <p:cNvPr id="5" name="Imagen 4"/>
+          <p:cNvPicPr>
+            <a:picLocks noChangeAspect="1"/>
+          </p:cNvPicPr>
+          <p:nvPr/>
+        </p:nvPicPr>
+        <p:blipFill>
+          <a:blip r:embed="rId3">
+            <a:extLst>
+              <a:ext uri="{28A0092B-C50C-407E-A947-70E740481C1C}">
+                <a14:useLocalDpi xmlns:a14="http://schemas.microsoft.com/office/drawing/2010/main" val="0"/>
+              </a:ext>
+            </a:extLst>
+          </a:blip>
+          <a:stretch>
+            <a:fillRect/>
+          </a:stretch>
+        </p:blipFill>
+        <p:spPr>
+          <a:xfrm>
+            <a:off x="9172575" y="0"/>
+            <a:ext cx="3019425" cy="1514475"/>
+          </a:xfrm>
+          <a:prstGeom prst="rect">
+            <a:avLst/>
+          </a:prstGeom>
+        </p:spPr>
+      </p:pic>
+    </p:spTree>
+    <p:extLst>
+      <p:ext uri="{BB962C8B-B14F-4D97-AF65-F5344CB8AC3E}">
+        <p14:creationId xmlns:p14="http://schemas.microsoft.com/office/powerpoint/2010/main" val="1849422042"/>
+      </p:ext>
+    </p:extLst>
+  </p:cSld>
+  <p:clrMapOvr>
+    <a:masterClrMapping/>
+  </p:clrMapOvr>
+  <p:timing>
+    <p:tnLst>
+      <p:par>
+        <p:cTn id="1" dur="indefinite" restart="never" nodeType="tmRoot"/>
+      </p:par>
+    </p:tnLst>
+  </p:timing>
+</p:sld>
+</file>
+
+<file path=ppt/slides/slide21.xml><?xml version="1.0" encoding="utf-8"?>
+<p:sld xmlns:a="http://schemas.openxmlformats.org/drawingml/2006/main" xmlns:r="http://schemas.openxmlformats.org/officeDocument/2006/relationships" xmlns:p="http://schemas.openxmlformats.org/presentationml/2006/main">
+  <p:cSld>
+    <p:spTree>
+      <p:nvGrpSpPr>
+        <p:cNvPr id="1" name=""/>
+        <p:cNvGrpSpPr/>
+        <p:nvPr/>
+      </p:nvGrpSpPr>
+      <p:grpSpPr>
+        <a:xfrm>
+          <a:off x="0" y="0"/>
+          <a:ext cx="0" cy="0"/>
+          <a:chOff x="0" y="0"/>
+          <a:chExt cx="0" cy="0"/>
+        </a:xfrm>
+      </p:grpSpPr>
+      <p:sp>
+        <p:nvSpPr>
+          <p:cNvPr id="2" name="Título 1"/>
+          <p:cNvSpPr>
+            <a:spLocks noGrp="1"/>
+          </p:cNvSpPr>
+          <p:nvPr>
+            <p:ph type="title"/>
+          </p:nvPr>
+        </p:nvSpPr>
+        <p:spPr/>
+        <p:txBody>
+          <a:bodyPr/>
+          <a:lstStyle/>
+          <a:p>
+            <a:r>
+              <a:rPr lang="es-AR" dirty="0" err="1" smtClean="0"/>
+              <a:t>Crazy</a:t>
+            </a:r>
+            <a:r>
+              <a:rPr lang="es-AR" dirty="0" smtClean="0"/>
+              <a:t> </a:t>
+            </a:r>
+            <a:r>
+              <a:rPr lang="es-AR" dirty="0" err="1" smtClean="0"/>
+              <a:t>Question</a:t>
+            </a:r>
+            <a:endParaRPr lang="es-ES" dirty="0"/>
+          </a:p>
+        </p:txBody>
+      </p:sp>
+      <p:pic>
+        <p:nvPicPr>
+          <p:cNvPr id="5" name="Marcador de contenido 4"/>
+          <p:cNvPicPr>
+            <a:picLocks noGrp="1" noChangeAspect="1"/>
+          </p:cNvPicPr>
+          <p:nvPr>
+            <p:ph idx="1"/>
+          </p:nvPr>
+        </p:nvPicPr>
+        <p:blipFill>
+          <a:blip r:embed="rId2"/>
+          <a:stretch>
+            <a:fillRect/>
+          </a:stretch>
+        </p:blipFill>
+        <p:spPr>
+          <a:xfrm>
+            <a:off x="759854" y="1737360"/>
+            <a:ext cx="7276563" cy="4720745"/>
+          </a:xfrm>
+          <a:prstGeom prst="rect">
+            <a:avLst/>
+          </a:prstGeom>
+        </p:spPr>
+      </p:pic>
+      <p:pic>
+        <p:nvPicPr>
+          <p:cNvPr id="4" name="Imagen 3"/>
+          <p:cNvPicPr>
+            <a:picLocks noChangeAspect="1"/>
+          </p:cNvPicPr>
+          <p:nvPr/>
+        </p:nvPicPr>
+        <p:blipFill>
+          <a:blip r:embed="rId3">
+            <a:extLst>
+              <a:ext uri="{28A0092B-C50C-407E-A947-70E740481C1C}">
+                <a14:useLocalDpi xmlns:a14="http://schemas.microsoft.com/office/drawing/2010/main" val="0"/>
+              </a:ext>
+            </a:extLst>
+          </a:blip>
+          <a:stretch>
+            <a:fillRect/>
+          </a:stretch>
+        </p:blipFill>
+        <p:spPr>
+          <a:xfrm>
+            <a:off x="9172575" y="0"/>
+            <a:ext cx="3019425" cy="1514475"/>
+          </a:xfrm>
+          <a:prstGeom prst="rect">
+            <a:avLst/>
+          </a:prstGeom>
+        </p:spPr>
+      </p:pic>
+    </p:spTree>
+    <p:extLst>
+      <p:ext uri="{BB962C8B-B14F-4D97-AF65-F5344CB8AC3E}">
+        <p14:creationId xmlns:p14="http://schemas.microsoft.com/office/powerpoint/2010/main" val="3049773630"/>
+      </p:ext>
+    </p:extLst>
+  </p:cSld>
+  <p:clrMapOvr>
+    <a:masterClrMapping/>
+  </p:clrMapOvr>
+  <p:timing>
+    <p:tnLst>
+      <p:par>
+        <p:cTn id="1" dur="indefinite" restart="never" nodeType="tmRoot"/>
+      </p:par>
+    </p:tnLst>
+  </p:timing>
+</p:sld>
+</file>
+
+<file path=ppt/slides/slide22.xml><?xml version="1.0" encoding="utf-8"?>
+<p:sld xmlns:a="http://schemas.openxmlformats.org/drawingml/2006/main" xmlns:r="http://schemas.openxmlformats.org/officeDocument/2006/relationships" xmlns:p="http://schemas.openxmlformats.org/presentationml/2006/main">
+  <p:cSld>
+    <p:spTree>
+      <p:nvGrpSpPr>
+        <p:cNvPr id="1" name=""/>
+        <p:cNvGrpSpPr/>
+        <p:nvPr/>
+      </p:nvGrpSpPr>
+      <p:grpSpPr>
+        <a:xfrm>
+          <a:off x="0" y="0"/>
+          <a:ext cx="0" cy="0"/>
+          <a:chOff x="0" y="0"/>
+          <a:chExt cx="0" cy="0"/>
+        </a:xfrm>
+      </p:grpSpPr>
+      <p:sp>
+        <p:nvSpPr>
+          <p:cNvPr id="2" name="Título 1"/>
+          <p:cNvSpPr>
+            <a:spLocks noGrp="1"/>
+          </p:cNvSpPr>
+          <p:nvPr>
+            <p:ph type="title"/>
+          </p:nvPr>
+        </p:nvSpPr>
+        <p:spPr/>
+        <p:txBody>
+          <a:bodyPr/>
+          <a:lstStyle/>
+          <a:p>
+            <a:r>
+              <a:rPr lang="es-AR" dirty="0" err="1" smtClean="0"/>
+              <a:t>Testing</a:t>
+            </a:r>
+            <a:endParaRPr lang="es-ES" dirty="0"/>
+          </a:p>
+        </p:txBody>
+      </p:sp>
+      <p:pic>
+        <p:nvPicPr>
+          <p:cNvPr id="5" name="Marcador de contenido 4"/>
+          <p:cNvPicPr>
+            <a:picLocks noGrp="1" noChangeAspect="1"/>
+          </p:cNvPicPr>
+          <p:nvPr>
+            <p:ph idx="1"/>
+          </p:nvPr>
+        </p:nvPicPr>
+        <p:blipFill>
+          <a:blip r:embed="rId2"/>
+          <a:stretch>
+            <a:fillRect/>
+          </a:stretch>
+        </p:blipFill>
+        <p:spPr>
+          <a:xfrm>
+            <a:off x="729445" y="1874412"/>
+            <a:ext cx="7083538" cy="4024111"/>
+          </a:xfrm>
+          <a:prstGeom prst="rect">
+            <a:avLst/>
+          </a:prstGeom>
+        </p:spPr>
+      </p:pic>
+      <p:pic>
+        <p:nvPicPr>
+          <p:cNvPr id="4" name="Imagen 3"/>
+          <p:cNvPicPr>
+            <a:picLocks noChangeAspect="1"/>
+          </p:cNvPicPr>
+          <p:nvPr/>
+        </p:nvPicPr>
+        <p:blipFill>
+          <a:blip r:embed="rId3">
+            <a:extLst>
+              <a:ext uri="{28A0092B-C50C-407E-A947-70E740481C1C}">
+                <a14:useLocalDpi xmlns:a14="http://schemas.microsoft.com/office/drawing/2010/main" val="0"/>
+              </a:ext>
+            </a:extLst>
+          </a:blip>
+          <a:stretch>
+            <a:fillRect/>
+          </a:stretch>
+        </p:blipFill>
+        <p:spPr>
+          <a:xfrm>
+            <a:off x="9172575" y="0"/>
+            <a:ext cx="3019425" cy="1514475"/>
+          </a:xfrm>
+          <a:prstGeom prst="rect">
+            <a:avLst/>
+          </a:prstGeom>
+        </p:spPr>
+      </p:pic>
+    </p:spTree>
+    <p:extLst>
+      <p:ext uri="{BB962C8B-B14F-4D97-AF65-F5344CB8AC3E}">
+        <p14:creationId xmlns:p14="http://schemas.microsoft.com/office/powerpoint/2010/main" val="1000766210"/>
+      </p:ext>
+    </p:extLst>
+  </p:cSld>
+  <p:clrMapOvr>
+    <a:masterClrMapping/>
+  </p:clrMapOvr>
+  <p:timing>
+    <p:tnLst>
+      <p:par>
+        <p:cTn id="1" dur="indefinite" restart="never" nodeType="tmRoot"/>
+      </p:par>
+    </p:tnLst>
+  </p:timing>
+</p:sld>
+</file>
+
+<file path=ppt/slides/slide23.xml><?xml version="1.0" encoding="utf-8"?>
+<p:sld xmlns:a="http://schemas.openxmlformats.org/drawingml/2006/main" xmlns:r="http://schemas.openxmlformats.org/officeDocument/2006/relationships" xmlns:p="http://schemas.openxmlformats.org/presentationml/2006/main">
+  <p:cSld>
+    <p:spTree>
+      <p:nvGrpSpPr>
+        <p:cNvPr id="1" name=""/>
+        <p:cNvGrpSpPr/>
+        <p:nvPr/>
+      </p:nvGrpSpPr>
+      <p:grpSpPr>
+        <a:xfrm>
+          <a:off x="0" y="0"/>
+          <a:ext cx="0" cy="0"/>
+          <a:chOff x="0" y="0"/>
+          <a:chExt cx="0" cy="0"/>
+        </a:xfrm>
+      </p:grpSpPr>
+      <p:sp>
+        <p:nvSpPr>
+          <p:cNvPr id="2" name="Título 1"/>
+          <p:cNvSpPr>
+            <a:spLocks noGrp="1"/>
+          </p:cNvSpPr>
+          <p:nvPr>
+            <p:ph type="title"/>
+          </p:nvPr>
+        </p:nvSpPr>
+        <p:spPr>
+          <a:xfrm>
+            <a:off x="193183" y="0"/>
+            <a:ext cx="8026114" cy="759854"/>
+          </a:xfrm>
+        </p:spPr>
+        <p:txBody>
+          <a:bodyPr/>
+          <a:lstStyle/>
+          <a:p>
+            <a:r>
+              <a:rPr lang="es-AR" dirty="0" err="1" smtClean="0"/>
+              <a:t>Testing</a:t>
+            </a:r>
+            <a:endParaRPr lang="es-ES" dirty="0"/>
+          </a:p>
+        </p:txBody>
+      </p:sp>
+      <p:pic>
+        <p:nvPicPr>
+          <p:cNvPr id="4" name="Marcador de contenido 3"/>
+          <p:cNvPicPr>
+            <a:picLocks noGrp="1" noChangeAspect="1"/>
+          </p:cNvPicPr>
+          <p:nvPr>
+            <p:ph idx="1"/>
+          </p:nvPr>
+        </p:nvPicPr>
+        <p:blipFill>
+          <a:blip r:embed="rId2">
+            <a:extLst>
+              <a:ext uri="{28A0092B-C50C-407E-A947-70E740481C1C}">
+                <a14:useLocalDpi xmlns:a14="http://schemas.microsoft.com/office/drawing/2010/main" val="0"/>
+              </a:ext>
+            </a:extLst>
+          </a:blip>
+          <a:stretch>
+            <a:fillRect/>
+          </a:stretch>
+        </p:blipFill>
+        <p:spPr>
+          <a:xfrm>
+            <a:off x="86791" y="1418488"/>
+            <a:ext cx="10595496" cy="5439512"/>
+          </a:xfrm>
+        </p:spPr>
+      </p:pic>
+      <p:pic>
+        <p:nvPicPr>
+          <p:cNvPr id="5" name="Imagen 4"/>
+          <p:cNvPicPr>
+            <a:picLocks noChangeAspect="1"/>
+          </p:cNvPicPr>
+          <p:nvPr/>
+        </p:nvPicPr>
+        <p:blipFill>
+          <a:blip r:embed="rId3">
+            <a:extLst>
+              <a:ext uri="{28A0092B-C50C-407E-A947-70E740481C1C}">
+                <a14:useLocalDpi xmlns:a14="http://schemas.microsoft.com/office/drawing/2010/main" val="0"/>
+              </a:ext>
+            </a:extLst>
+          </a:blip>
+          <a:stretch>
+            <a:fillRect/>
+          </a:stretch>
+        </p:blipFill>
+        <p:spPr>
+          <a:xfrm>
+            <a:off x="9172575" y="0"/>
+            <a:ext cx="3019425" cy="1514475"/>
+          </a:xfrm>
+          <a:prstGeom prst="rect">
+            <a:avLst/>
+          </a:prstGeom>
+        </p:spPr>
+      </p:pic>
+    </p:spTree>
+    <p:extLst>
+      <p:ext uri="{BB962C8B-B14F-4D97-AF65-F5344CB8AC3E}">
+        <p14:creationId xmlns:p14="http://schemas.microsoft.com/office/powerpoint/2010/main" val="2187881823"/>
+      </p:ext>
+    </p:extLst>
+  </p:cSld>
+  <p:clrMapOvr>
+    <a:masterClrMapping/>
+  </p:clrMapOvr>
+  <p:timing>
+    <p:tnLst>
+      <p:par>
+        <p:cTn id="1" dur="indefinite" restart="never" nodeType="tmRoot"/>
+      </p:par>
+    </p:tnLst>
+  </p:timing>
+</p:sld>
+</file>
+
+<file path=ppt/slides/slide24.xml><?xml version="1.0" encoding="utf-8"?>
+<p:sld xmlns:a="http://schemas.openxmlformats.org/drawingml/2006/main" xmlns:r="http://schemas.openxmlformats.org/officeDocument/2006/relationships" xmlns:p="http://schemas.openxmlformats.org/presentationml/2006/main">
+  <p:cSld>
+    <p:spTree>
+      <p:nvGrpSpPr>
+        <p:cNvPr id="1" name=""/>
+        <p:cNvGrpSpPr/>
+        <p:nvPr/>
+      </p:nvGrpSpPr>
+      <p:grpSpPr>
+        <a:xfrm>
+          <a:off x="0" y="0"/>
+          <a:ext cx="0" cy="0"/>
+          <a:chOff x="0" y="0"/>
+          <a:chExt cx="0" cy="0"/>
+        </a:xfrm>
+      </p:grpSpPr>
+      <p:sp>
+        <p:nvSpPr>
+          <p:cNvPr id="2" name="Título 1"/>
+          <p:cNvSpPr>
+            <a:spLocks noGrp="1"/>
+          </p:cNvSpPr>
+          <p:nvPr>
+            <p:ph type="title"/>
+          </p:nvPr>
+        </p:nvSpPr>
+        <p:spPr>
+          <a:xfrm>
+            <a:off x="208638" y="-725379"/>
+            <a:ext cx="10058400" cy="1450757"/>
+          </a:xfrm>
+        </p:spPr>
+        <p:txBody>
+          <a:bodyPr/>
+          <a:lstStyle/>
+          <a:p>
+            <a:r>
+              <a:rPr lang="es-AR" dirty="0" err="1" smtClean="0"/>
+              <a:t>Testing</a:t>
+            </a:r>
+            <a:endParaRPr lang="es-ES" dirty="0"/>
+          </a:p>
+        </p:txBody>
+      </p:sp>
+      <p:pic>
+        <p:nvPicPr>
+          <p:cNvPr id="4" name="Marcador de contenido 3"/>
+          <p:cNvPicPr>
+            <a:picLocks noGrp="1" noChangeAspect="1"/>
+          </p:cNvPicPr>
+          <p:nvPr>
+            <p:ph idx="1"/>
+          </p:nvPr>
+        </p:nvPicPr>
+        <p:blipFill>
+          <a:blip r:embed="rId2">
+            <a:extLst>
+              <a:ext uri="{28A0092B-C50C-407E-A947-70E740481C1C}">
+                <a14:useLocalDpi xmlns:a14="http://schemas.microsoft.com/office/drawing/2010/main" val="0"/>
+              </a:ext>
+            </a:extLst>
+          </a:blip>
+          <a:stretch>
+            <a:fillRect/>
+          </a:stretch>
+        </p:blipFill>
+        <p:spPr>
+          <a:xfrm>
+            <a:off x="343150" y="996257"/>
+            <a:ext cx="9347351" cy="5288633"/>
+          </a:xfrm>
+        </p:spPr>
+      </p:pic>
+      <p:pic>
+        <p:nvPicPr>
+          <p:cNvPr id="5" name="Imagen 4"/>
+          <p:cNvPicPr>
+            <a:picLocks noChangeAspect="1"/>
+          </p:cNvPicPr>
+          <p:nvPr/>
+        </p:nvPicPr>
+        <p:blipFill>
+          <a:blip r:embed="rId3">
+            <a:extLst>
+              <a:ext uri="{28A0092B-C50C-407E-A947-70E740481C1C}">
+                <a14:useLocalDpi xmlns:a14="http://schemas.microsoft.com/office/drawing/2010/main" val="0"/>
+              </a:ext>
+            </a:extLst>
+          </a:blip>
+          <a:stretch>
+            <a:fillRect/>
+          </a:stretch>
+        </p:blipFill>
+        <p:spPr>
+          <a:xfrm>
+            <a:off x="9172575" y="0"/>
+            <a:ext cx="3019425" cy="1514475"/>
+          </a:xfrm>
+          <a:prstGeom prst="rect">
+            <a:avLst/>
+          </a:prstGeom>
+        </p:spPr>
+      </p:pic>
+    </p:spTree>
+    <p:extLst>
+      <p:ext uri="{BB962C8B-B14F-4D97-AF65-F5344CB8AC3E}">
+        <p14:creationId xmlns:p14="http://schemas.microsoft.com/office/powerpoint/2010/main" val="3577965346"/>
+      </p:ext>
+    </p:extLst>
+  </p:cSld>
+  <p:clrMapOvr>
+    <a:masterClrMapping/>
+  </p:clrMapOvr>
+  <p:timing>
+    <p:tnLst>
+      <p:par>
+        <p:cTn id="1" dur="indefinite" restart="never" nodeType="tmRoot"/>
+      </p:par>
+    </p:tnLst>
+  </p:timing>
+</p:sld>
+</file>
+
+<file path=ppt/slides/slide25.xml><?xml version="1.0" encoding="utf-8"?>
+<p:sld xmlns:a="http://schemas.openxmlformats.org/drawingml/2006/main" xmlns:r="http://schemas.openxmlformats.org/officeDocument/2006/relationships" xmlns:p="http://schemas.openxmlformats.org/presentationml/2006/main">
+  <p:cSld>
+    <p:spTree>
+      <p:nvGrpSpPr>
+        <p:cNvPr id="1" name=""/>
+        <p:cNvGrpSpPr/>
+        <p:nvPr/>
+      </p:nvGrpSpPr>
+      <p:grpSpPr>
+        <a:xfrm>
+          <a:off x="0" y="0"/>
+          <a:ext cx="0" cy="0"/>
+          <a:chOff x="0" y="0"/>
+          <a:chExt cx="0" cy="0"/>
+        </a:xfrm>
+      </p:grpSpPr>
+      <p:sp>
+        <p:nvSpPr>
+          <p:cNvPr id="2" name="Título 1"/>
+          <p:cNvSpPr>
+            <a:spLocks noGrp="1"/>
+          </p:cNvSpPr>
+          <p:nvPr>
+            <p:ph type="title"/>
+          </p:nvPr>
+        </p:nvSpPr>
+        <p:spPr/>
+        <p:txBody>
+          <a:bodyPr/>
+          <a:lstStyle/>
+          <a:p>
+            <a:r>
+              <a:rPr lang="es-AR" dirty="0" smtClean="0"/>
+              <a:t>Muchas gracias por escucharnos</a:t>
+            </a:r>
+            <a:endParaRPr lang="es-ES" dirty="0"/>
+          </a:p>
+        </p:txBody>
+      </p:sp>
+      <p:sp>
+        <p:nvSpPr>
+          <p:cNvPr id="3" name="Marcador de contenido 2"/>
+          <p:cNvSpPr>
+            <a:spLocks noGrp="1"/>
+          </p:cNvSpPr>
+          <p:nvPr>
+            <p:ph idx="1"/>
+          </p:nvPr>
+        </p:nvSpPr>
+        <p:spPr/>
+        <p:txBody>
+          <a:bodyPr/>
+          <a:lstStyle/>
+          <a:p>
+            <a:endParaRPr lang="es-ES" dirty="0"/>
+          </a:p>
+        </p:txBody>
+      </p:sp>
+      <p:pic>
+        <p:nvPicPr>
+          <p:cNvPr id="4" name="Imagen 3"/>
+          <p:cNvPicPr>
+            <a:picLocks noChangeAspect="1"/>
+          </p:cNvPicPr>
+          <p:nvPr/>
+        </p:nvPicPr>
+        <p:blipFill>
+          <a:blip r:embed="rId2">
+            <a:extLst>
+              <a:ext uri="{28A0092B-C50C-407E-A947-70E740481C1C}">
+                <a14:useLocalDpi xmlns:a14="http://schemas.microsoft.com/office/drawing/2010/main" val="0"/>
+              </a:ext>
+            </a:extLst>
+          </a:blip>
+          <a:stretch>
+            <a:fillRect/>
+          </a:stretch>
+        </p:blipFill>
+        <p:spPr>
+          <a:xfrm>
+            <a:off x="9172575" y="0"/>
+            <a:ext cx="3019425" cy="1514475"/>
+          </a:xfrm>
+          <a:prstGeom prst="rect">
+            <a:avLst/>
+          </a:prstGeom>
+        </p:spPr>
+      </p:pic>
+    </p:spTree>
+    <p:extLst>
+      <p:ext uri="{BB962C8B-B14F-4D97-AF65-F5344CB8AC3E}">
+        <p14:creationId xmlns:p14="http://schemas.microsoft.com/office/powerpoint/2010/main" val="2026814309"/>
       </p:ext>
     </p:extLst>
   </p:cSld>

</xml_diff>

<commit_message>
modifico presentacion de trabajo
</commit_message>
<xml_diff>
--- a/docs/Trabajo Final De Ingeniería En Software.pptx
+++ b/docs/Trabajo Final De Ingeniería En Software.pptx
@@ -27,9 +27,13 @@
     <p:sldId id="277" r:id="rId21"/>
     <p:sldId id="278" r:id="rId22"/>
     <p:sldId id="279" r:id="rId23"/>
-    <p:sldId id="280" r:id="rId24"/>
-    <p:sldId id="281" r:id="rId25"/>
-    <p:sldId id="270" r:id="rId26"/>
+    <p:sldId id="282" r:id="rId24"/>
+    <p:sldId id="280" r:id="rId25"/>
+    <p:sldId id="281" r:id="rId26"/>
+    <p:sldId id="285" r:id="rId27"/>
+    <p:sldId id="284" r:id="rId28"/>
+    <p:sldId id="283" r:id="rId29"/>
+    <p:sldId id="270" r:id="rId30"/>
   </p:sldIdLst>
   <p:sldSz cx="12192000" cy="6858000"/>
   <p:notesSz cx="6858000" cy="9144000"/>
@@ -5754,7 +5758,7 @@
           <a:lstStyle/>
           <a:p>
             <a:r>
-              <a:rPr lang="es-AR" dirty="0" err="1" smtClean="0"/>
+              <a:rPr lang="es-AR" dirty="0" smtClean="0"/>
               <a:t>Testing</a:t>
             </a:r>
             <a:endParaRPr lang="es-ES" dirty="0"/>
@@ -5864,6 +5868,108 @@
             <p:ph type="title"/>
           </p:nvPr>
         </p:nvSpPr>
+        <p:spPr/>
+        <p:txBody>
+          <a:bodyPr/>
+          <a:lstStyle/>
+          <a:p>
+            <a:r>
+              <a:rPr lang="es-AR" dirty="0" smtClean="0"/>
+              <a:t>Testing</a:t>
+            </a:r>
+            <a:endParaRPr lang="es-ES" dirty="0"/>
+          </a:p>
+        </p:txBody>
+      </p:sp>
+      <p:sp>
+        <p:nvSpPr>
+          <p:cNvPr id="3" name="Marcador de contenido 2"/>
+          <p:cNvSpPr>
+            <a:spLocks noGrp="1"/>
+          </p:cNvSpPr>
+          <p:nvPr>
+            <p:ph idx="1"/>
+          </p:nvPr>
+        </p:nvSpPr>
+        <p:spPr/>
+        <p:txBody>
+          <a:bodyPr/>
+          <a:lstStyle/>
+          <a:p>
+            <a:endParaRPr lang="es-ES" dirty="0"/>
+          </a:p>
+        </p:txBody>
+      </p:sp>
+      <p:pic>
+        <p:nvPicPr>
+          <p:cNvPr id="4" name="Imagen 3"/>
+          <p:cNvPicPr>
+            <a:picLocks noChangeAspect="1"/>
+          </p:cNvPicPr>
+          <p:nvPr/>
+        </p:nvPicPr>
+        <p:blipFill>
+          <a:blip r:embed="rId2">
+            <a:extLst>
+              <a:ext uri="{28A0092B-C50C-407E-A947-70E740481C1C}">
+                <a14:useLocalDpi xmlns:a14="http://schemas.microsoft.com/office/drawing/2010/main" val="0"/>
+              </a:ext>
+            </a:extLst>
+          </a:blip>
+          <a:stretch>
+            <a:fillRect/>
+          </a:stretch>
+        </p:blipFill>
+        <p:spPr>
+          <a:xfrm>
+            <a:off x="9172575" y="0"/>
+            <a:ext cx="3019425" cy="1514475"/>
+          </a:xfrm>
+          <a:prstGeom prst="rect">
+            <a:avLst/>
+          </a:prstGeom>
+        </p:spPr>
+      </p:pic>
+    </p:spTree>
+    <p:extLst>
+      <p:ext uri="{BB962C8B-B14F-4D97-AF65-F5344CB8AC3E}">
+        <p14:creationId xmlns:p14="http://schemas.microsoft.com/office/powerpoint/2010/main" val="3606386892"/>
+      </p:ext>
+    </p:extLst>
+  </p:cSld>
+  <p:clrMapOvr>
+    <a:masterClrMapping/>
+  </p:clrMapOvr>
+</p:sld>
+</file>
+
+<file path=ppt/slides/slide24.xml><?xml version="1.0" encoding="utf-8"?>
+<p:sld xmlns:a="http://schemas.openxmlformats.org/drawingml/2006/main" xmlns:r="http://schemas.openxmlformats.org/officeDocument/2006/relationships" xmlns:p="http://schemas.openxmlformats.org/presentationml/2006/main">
+  <p:cSld>
+    <p:spTree>
+      <p:nvGrpSpPr>
+        <p:cNvPr id="1" name=""/>
+        <p:cNvGrpSpPr/>
+        <p:nvPr/>
+      </p:nvGrpSpPr>
+      <p:grpSpPr>
+        <a:xfrm>
+          <a:off x="0" y="0"/>
+          <a:ext cx="0" cy="0"/>
+          <a:chOff x="0" y="0"/>
+          <a:chExt cx="0" cy="0"/>
+        </a:xfrm>
+      </p:grpSpPr>
+      <p:sp>
+        <p:nvSpPr>
+          <p:cNvPr id="2" name="Título 1"/>
+          <p:cNvSpPr>
+            <a:spLocks noGrp="1"/>
+          </p:cNvSpPr>
+          <p:nvPr>
+            <p:ph type="title"/>
+          </p:nvPr>
+        </p:nvSpPr>
         <p:spPr>
           <a:xfrm>
             <a:off x="193183" y="0"/>
@@ -5875,7 +5981,7 @@
           <a:lstStyle/>
           <a:p>
             <a:r>
-              <a:rPr lang="es-AR" dirty="0" err="1" smtClean="0"/>
+              <a:rPr lang="es-AR" dirty="0" smtClean="0"/>
               <a:t>Testing</a:t>
             </a:r>
             <a:endParaRPr lang="es-ES" dirty="0"/>
@@ -5961,7 +6067,7 @@
 </p:sld>
 </file>
 
-<file path=ppt/slides/slide24.xml><?xml version="1.0" encoding="utf-8"?>
+<file path=ppt/slides/slide25.xml><?xml version="1.0" encoding="utf-8"?>
 <p:sld xmlns:a="http://schemas.openxmlformats.org/drawingml/2006/main" xmlns:r="http://schemas.openxmlformats.org/officeDocument/2006/relationships" xmlns:p="http://schemas.openxmlformats.org/presentationml/2006/main">
   <p:cSld>
     <p:spTree>
@@ -5999,7 +6105,7 @@
           <a:lstStyle/>
           <a:p>
             <a:r>
-              <a:rPr lang="es-AR" dirty="0" err="1" smtClean="0"/>
+              <a:rPr lang="es-AR" dirty="0" smtClean="0"/>
               <a:t>Testing</a:t>
             </a:r>
             <a:endParaRPr lang="es-ES" dirty="0"/>
@@ -6085,7 +6191,350 @@
 </p:sld>
 </file>
 
-<file path=ppt/slides/slide25.xml><?xml version="1.0" encoding="utf-8"?>
+<file path=ppt/slides/slide26.xml><?xml version="1.0" encoding="utf-8"?>
+<p:sld xmlns:a="http://schemas.openxmlformats.org/drawingml/2006/main" xmlns:r="http://schemas.openxmlformats.org/officeDocument/2006/relationships" xmlns:p="http://schemas.openxmlformats.org/presentationml/2006/main">
+  <p:cSld>
+    <p:spTree>
+      <p:nvGrpSpPr>
+        <p:cNvPr id="1" name=""/>
+        <p:cNvGrpSpPr/>
+        <p:nvPr/>
+      </p:nvGrpSpPr>
+      <p:grpSpPr>
+        <a:xfrm>
+          <a:off x="0" y="0"/>
+          <a:ext cx="0" cy="0"/>
+          <a:chOff x="0" y="0"/>
+          <a:chExt cx="0" cy="0"/>
+        </a:xfrm>
+      </p:grpSpPr>
+      <p:sp>
+        <p:nvSpPr>
+          <p:cNvPr id="2" name="Título 1"/>
+          <p:cNvSpPr>
+            <a:spLocks noGrp="1"/>
+          </p:cNvSpPr>
+          <p:nvPr>
+            <p:ph type="title"/>
+          </p:nvPr>
+        </p:nvSpPr>
+        <p:spPr>
+          <a:xfrm>
+            <a:off x="0" y="0"/>
+            <a:ext cx="9893550" cy="758566"/>
+          </a:xfrm>
+        </p:spPr>
+        <p:txBody>
+          <a:bodyPr/>
+          <a:lstStyle/>
+          <a:p>
+            <a:r>
+              <a:rPr lang="es-AR" dirty="0" smtClean="0"/>
+              <a:t>Testing</a:t>
+            </a:r>
+            <a:endParaRPr lang="es-ES" dirty="0"/>
+          </a:p>
+        </p:txBody>
+      </p:sp>
+      <p:pic>
+        <p:nvPicPr>
+          <p:cNvPr id="4" name="Marcador de contenido 3"/>
+          <p:cNvPicPr>
+            <a:picLocks noGrp="1" noChangeAspect="1"/>
+          </p:cNvPicPr>
+          <p:nvPr>
+            <p:ph idx="1"/>
+          </p:nvPr>
+        </p:nvPicPr>
+        <p:blipFill>
+          <a:blip r:embed="rId2">
+            <a:extLst>
+              <a:ext uri="{28A0092B-C50C-407E-A947-70E740481C1C}">
+                <a14:useLocalDpi xmlns:a14="http://schemas.microsoft.com/office/drawing/2010/main" val="0"/>
+              </a:ext>
+            </a:extLst>
+          </a:blip>
+          <a:stretch>
+            <a:fillRect/>
+          </a:stretch>
+        </p:blipFill>
+        <p:spPr>
+          <a:xfrm>
+            <a:off x="284117" y="1020248"/>
+            <a:ext cx="5215161" cy="5342360"/>
+          </a:xfrm>
+        </p:spPr>
+      </p:pic>
+      <p:pic>
+        <p:nvPicPr>
+          <p:cNvPr id="5" name="Imagen 4"/>
+          <p:cNvPicPr>
+            <a:picLocks noChangeAspect="1"/>
+          </p:cNvPicPr>
+          <p:nvPr/>
+        </p:nvPicPr>
+        <p:blipFill>
+          <a:blip r:embed="rId3">
+            <a:extLst>
+              <a:ext uri="{28A0092B-C50C-407E-A947-70E740481C1C}">
+                <a14:useLocalDpi xmlns:a14="http://schemas.microsoft.com/office/drawing/2010/main" val="0"/>
+              </a:ext>
+            </a:extLst>
+          </a:blip>
+          <a:stretch>
+            <a:fillRect/>
+          </a:stretch>
+        </p:blipFill>
+        <p:spPr>
+          <a:xfrm>
+            <a:off x="9172575" y="0"/>
+            <a:ext cx="3019425" cy="1514475"/>
+          </a:xfrm>
+          <a:prstGeom prst="rect">
+            <a:avLst/>
+          </a:prstGeom>
+        </p:spPr>
+      </p:pic>
+    </p:spTree>
+    <p:extLst>
+      <p:ext uri="{BB962C8B-B14F-4D97-AF65-F5344CB8AC3E}">
+        <p14:creationId xmlns:p14="http://schemas.microsoft.com/office/powerpoint/2010/main" val="1842127170"/>
+      </p:ext>
+    </p:extLst>
+  </p:cSld>
+  <p:clrMapOvr>
+    <a:masterClrMapping/>
+  </p:clrMapOvr>
+</p:sld>
+</file>
+
+<file path=ppt/slides/slide27.xml><?xml version="1.0" encoding="utf-8"?>
+<p:sld xmlns:a="http://schemas.openxmlformats.org/drawingml/2006/main" xmlns:r="http://schemas.openxmlformats.org/officeDocument/2006/relationships" xmlns:p="http://schemas.openxmlformats.org/presentationml/2006/main">
+  <p:cSld>
+    <p:spTree>
+      <p:nvGrpSpPr>
+        <p:cNvPr id="1" name=""/>
+        <p:cNvGrpSpPr/>
+        <p:nvPr/>
+      </p:nvGrpSpPr>
+      <p:grpSpPr>
+        <a:xfrm>
+          <a:off x="0" y="0"/>
+          <a:ext cx="0" cy="0"/>
+          <a:chOff x="0" y="0"/>
+          <a:chExt cx="0" cy="0"/>
+        </a:xfrm>
+      </p:grpSpPr>
+      <p:sp>
+        <p:nvSpPr>
+          <p:cNvPr id="2" name="Título 1"/>
+          <p:cNvSpPr>
+            <a:spLocks noGrp="1"/>
+          </p:cNvSpPr>
+          <p:nvPr>
+            <p:ph type="title"/>
+          </p:nvPr>
+        </p:nvSpPr>
+        <p:spPr/>
+        <p:txBody>
+          <a:bodyPr/>
+          <a:lstStyle/>
+          <a:p>
+            <a:r>
+              <a:rPr lang="es-AR" dirty="0" err="1" smtClean="0"/>
+              <a:t>Gestion</a:t>
+            </a:r>
+            <a:r>
+              <a:rPr lang="es-AR" dirty="0" smtClean="0"/>
+              <a:t> de defectos</a:t>
+            </a:r>
+            <a:endParaRPr lang="es-ES" dirty="0"/>
+          </a:p>
+        </p:txBody>
+      </p:sp>
+      <p:pic>
+        <p:nvPicPr>
+          <p:cNvPr id="5" name="Marcador de contenido 4"/>
+          <p:cNvPicPr>
+            <a:picLocks noGrp="1" noChangeAspect="1"/>
+          </p:cNvPicPr>
+          <p:nvPr>
+            <p:ph idx="1"/>
+          </p:nvPr>
+        </p:nvPicPr>
+        <p:blipFill>
+          <a:blip r:embed="rId2"/>
+          <a:stretch>
+            <a:fillRect/>
+          </a:stretch>
+        </p:blipFill>
+        <p:spPr>
+          <a:xfrm>
+            <a:off x="417663" y="1801078"/>
+            <a:ext cx="11622555" cy="3801232"/>
+          </a:xfrm>
+          <a:prstGeom prst="rect">
+            <a:avLst/>
+          </a:prstGeom>
+        </p:spPr>
+      </p:pic>
+      <p:pic>
+        <p:nvPicPr>
+          <p:cNvPr id="4" name="Imagen 3"/>
+          <p:cNvPicPr>
+            <a:picLocks noChangeAspect="1"/>
+          </p:cNvPicPr>
+          <p:nvPr/>
+        </p:nvPicPr>
+        <p:blipFill>
+          <a:blip r:embed="rId3">
+            <a:extLst>
+              <a:ext uri="{28A0092B-C50C-407E-A947-70E740481C1C}">
+                <a14:useLocalDpi xmlns:a14="http://schemas.microsoft.com/office/drawing/2010/main" val="0"/>
+              </a:ext>
+            </a:extLst>
+          </a:blip>
+          <a:stretch>
+            <a:fillRect/>
+          </a:stretch>
+        </p:blipFill>
+        <p:spPr>
+          <a:xfrm>
+            <a:off x="9172575" y="0"/>
+            <a:ext cx="3019425" cy="1514475"/>
+          </a:xfrm>
+          <a:prstGeom prst="rect">
+            <a:avLst/>
+          </a:prstGeom>
+        </p:spPr>
+      </p:pic>
+    </p:spTree>
+    <p:extLst>
+      <p:ext uri="{BB962C8B-B14F-4D97-AF65-F5344CB8AC3E}">
+        <p14:creationId xmlns:p14="http://schemas.microsoft.com/office/powerpoint/2010/main" val="2206987222"/>
+      </p:ext>
+    </p:extLst>
+  </p:cSld>
+  <p:clrMapOvr>
+    <a:masterClrMapping/>
+  </p:clrMapOvr>
+</p:sld>
+</file>
+
+<file path=ppt/slides/slide28.xml><?xml version="1.0" encoding="utf-8"?>
+<p:sld xmlns:a="http://schemas.openxmlformats.org/drawingml/2006/main" xmlns:r="http://schemas.openxmlformats.org/officeDocument/2006/relationships" xmlns:p="http://schemas.openxmlformats.org/presentationml/2006/main">
+  <p:cSld>
+    <p:spTree>
+      <p:nvGrpSpPr>
+        <p:cNvPr id="1" name=""/>
+        <p:cNvGrpSpPr/>
+        <p:nvPr/>
+      </p:nvGrpSpPr>
+      <p:grpSpPr>
+        <a:xfrm>
+          <a:off x="0" y="0"/>
+          <a:ext cx="0" cy="0"/>
+          <a:chOff x="0" y="0"/>
+          <a:chExt cx="0" cy="0"/>
+        </a:xfrm>
+      </p:grpSpPr>
+      <p:sp>
+        <p:nvSpPr>
+          <p:cNvPr id="2" name="Título 1"/>
+          <p:cNvSpPr>
+            <a:spLocks noGrp="1"/>
+          </p:cNvSpPr>
+          <p:nvPr>
+            <p:ph type="title"/>
+          </p:nvPr>
+        </p:nvSpPr>
+        <p:spPr/>
+        <p:txBody>
+          <a:bodyPr/>
+          <a:lstStyle/>
+          <a:p>
+            <a:r>
+              <a:rPr lang="es-AR" dirty="0" err="1" smtClean="0"/>
+              <a:t>Gestion</a:t>
+            </a:r>
+            <a:r>
+              <a:rPr lang="es-AR" dirty="0" smtClean="0"/>
+              <a:t> de defecto</a:t>
+            </a:r>
+            <a:endParaRPr lang="es-ES" dirty="0"/>
+          </a:p>
+        </p:txBody>
+      </p:sp>
+      <p:pic>
+        <p:nvPicPr>
+          <p:cNvPr id="5" name="Marcador de contenido 4"/>
+          <p:cNvPicPr>
+            <a:picLocks noGrp="1" noChangeAspect="1"/>
+          </p:cNvPicPr>
+          <p:nvPr>
+            <p:ph idx="1"/>
+          </p:nvPr>
+        </p:nvPicPr>
+        <p:blipFill>
+          <a:blip r:embed="rId2"/>
+          <a:stretch>
+            <a:fillRect/>
+          </a:stretch>
+        </p:blipFill>
+        <p:spPr>
+          <a:xfrm>
+            <a:off x="618531" y="1737360"/>
+            <a:ext cx="9362596" cy="5110189"/>
+          </a:xfrm>
+          <a:prstGeom prst="rect">
+            <a:avLst/>
+          </a:prstGeom>
+        </p:spPr>
+      </p:pic>
+      <p:pic>
+        <p:nvPicPr>
+          <p:cNvPr id="4" name="Imagen 3"/>
+          <p:cNvPicPr>
+            <a:picLocks noChangeAspect="1"/>
+          </p:cNvPicPr>
+          <p:nvPr/>
+        </p:nvPicPr>
+        <p:blipFill>
+          <a:blip r:embed="rId3">
+            <a:extLst>
+              <a:ext uri="{28A0092B-C50C-407E-A947-70E740481C1C}">
+                <a14:useLocalDpi xmlns:a14="http://schemas.microsoft.com/office/drawing/2010/main" val="0"/>
+              </a:ext>
+            </a:extLst>
+          </a:blip>
+          <a:stretch>
+            <a:fillRect/>
+          </a:stretch>
+        </p:blipFill>
+        <p:spPr>
+          <a:xfrm>
+            <a:off x="9172575" y="0"/>
+            <a:ext cx="3019425" cy="1514475"/>
+          </a:xfrm>
+          <a:prstGeom prst="rect">
+            <a:avLst/>
+          </a:prstGeom>
+        </p:spPr>
+      </p:pic>
+    </p:spTree>
+    <p:extLst>
+      <p:ext uri="{BB962C8B-B14F-4D97-AF65-F5344CB8AC3E}">
+        <p14:creationId xmlns:p14="http://schemas.microsoft.com/office/powerpoint/2010/main" val="2794050985"/>
+      </p:ext>
+    </p:extLst>
+  </p:cSld>
+  <p:clrMapOvr>
+    <a:masterClrMapping/>
+  </p:clrMapOvr>
+</p:sld>
+</file>
+
+<file path=ppt/slides/slide29.xml><?xml version="1.0" encoding="utf-8"?>
 <p:sld xmlns:a="http://schemas.openxmlformats.org/drawingml/2006/main" xmlns:r="http://schemas.openxmlformats.org/officeDocument/2006/relationships" xmlns:p="http://schemas.openxmlformats.org/presentationml/2006/main">
   <p:cSld>
     <p:spTree>

</xml_diff>